<commit_message>
Move logos a bit.
</commit_message>
<xml_diff>
--- a/2019/03/htp.2019.03.04-01.pptx
+++ b/2019/03/htp.2019.03.04-01.pptx
@@ -5463,7 +5463,7 @@
           <a:p>
             <a:fld id="{30BCFC17-923C-4E5F-AB6C-5AE5260A447B}" type="datetimeFigureOut">
               <a:rPr lang="ru-RU" smtClean="0"/>
-              <a:t>03.03.2019</a:t>
+              <a:t>04.03.2019</a:t>
             </a:fld>
             <a:endParaRPr lang="ru-RU"/>
           </a:p>
@@ -5640,7 +5640,7 @@
           <a:p>
             <a:fld id="{FCD118CD-F0C5-452A-A7F7-828CAC5D8500}" type="datetimeFigureOut">
               <a:rPr lang="ru-RU" smtClean="0"/>
-              <a:t>03.03.2019</a:t>
+              <a:t>04.03.2019</a:t>
             </a:fld>
             <a:endParaRPr lang="ru-RU"/>
           </a:p>
@@ -6141,7 +6141,7 @@
           <a:p>
             <a:fld id="{AA4DA509-74D1-4911-BC60-BA4FA3573B51}" type="datetime1">
               <a:rPr lang="ru-RU" smtClean="0"/>
-              <a:t>03.03.2019</a:t>
+              <a:t>04.03.2019</a:t>
             </a:fld>
             <a:endParaRPr lang="ru-RU"/>
           </a:p>
@@ -6346,7 +6346,7 @@
           <a:p>
             <a:fld id="{47ABABF6-1680-45B3-921B-58CD32BE1A69}" type="datetime1">
               <a:rPr lang="ru-RU" smtClean="0"/>
-              <a:t>03.03.2019</a:t>
+              <a:t>04.03.2019</a:t>
             </a:fld>
             <a:endParaRPr lang="ru-RU"/>
           </a:p>
@@ -6556,7 +6556,7 @@
           <a:p>
             <a:fld id="{ACFDD49F-977F-4C8B-864B-00A4D1611A1D}" type="datetime1">
               <a:rPr lang="ru-RU" smtClean="0"/>
-              <a:t>03.03.2019</a:t>
+              <a:t>04.03.2019</a:t>
             </a:fld>
             <a:endParaRPr lang="ru-RU"/>
           </a:p>
@@ -6762,7 +6762,7 @@
           <a:p>
             <a:fld id="{442A7E7D-DEA4-4E8B-AA0F-7CF7F76A3087}" type="datetime1">
               <a:rPr lang="ru-RU" smtClean="0"/>
-              <a:t>03.03.2019</a:t>
+              <a:t>04.03.2019</a:t>
             </a:fld>
             <a:endParaRPr lang="ru-RU"/>
           </a:p>
@@ -7043,7 +7043,7 @@
           <a:p>
             <a:fld id="{5BEC8353-239D-4212-84D7-C0B9D2DFBD6D}" type="datetime1">
               <a:rPr lang="ru-RU" smtClean="0"/>
-              <a:t>03.03.2019</a:t>
+              <a:t>04.03.2019</a:t>
             </a:fld>
             <a:endParaRPr lang="ru-RU"/>
           </a:p>
@@ -7311,7 +7311,7 @@
           <a:p>
             <a:fld id="{89B6A1F2-1F36-43C6-95D0-57F4721D1C7A}" type="datetime1">
               <a:rPr lang="ru-RU" smtClean="0"/>
-              <a:t>03.03.2019</a:t>
+              <a:t>04.03.2019</a:t>
             </a:fld>
             <a:endParaRPr lang="ru-RU"/>
           </a:p>
@@ -7726,7 +7726,7 @@
           <a:p>
             <a:fld id="{6016AF81-D610-48DC-9162-E7D89E626A55}" type="datetime1">
               <a:rPr lang="ru-RU" smtClean="0"/>
-              <a:t>03.03.2019</a:t>
+              <a:t>04.03.2019</a:t>
             </a:fld>
             <a:endParaRPr lang="ru-RU"/>
           </a:p>
@@ -7868,7 +7868,7 @@
           <a:p>
             <a:fld id="{86263ED4-D2B5-45BE-A6AD-DD492CF59446}" type="datetime1">
               <a:rPr lang="ru-RU" smtClean="0"/>
-              <a:t>03.03.2019</a:t>
+              <a:t>04.03.2019</a:t>
             </a:fld>
             <a:endParaRPr lang="ru-RU"/>
           </a:p>
@@ -7981,7 +7981,7 @@
           <a:p>
             <a:fld id="{88163182-9035-49E6-B4C2-D51FEDEDA3F0}" type="datetime1">
               <a:rPr lang="ru-RU" smtClean="0"/>
-              <a:t>03.03.2019</a:t>
+              <a:t>04.03.2019</a:t>
             </a:fld>
             <a:endParaRPr lang="ru-RU"/>
           </a:p>
@@ -8294,7 +8294,7 @@
           <a:p>
             <a:fld id="{CE18D2C0-2028-466A-A119-D4641640E2B7}" type="datetime1">
               <a:rPr lang="ru-RU" smtClean="0"/>
-              <a:t>03.03.2019</a:t>
+              <a:t>04.03.2019</a:t>
             </a:fld>
             <a:endParaRPr lang="ru-RU"/>
           </a:p>
@@ -8583,7 +8583,7 @@
           <a:p>
             <a:fld id="{2418DD69-943B-4FED-B16B-EB58357A624D}" type="datetime1">
               <a:rPr lang="ru-RU" smtClean="0"/>
-              <a:t>03.03.2019</a:t>
+              <a:t>04.03.2019</a:t>
             </a:fld>
             <a:endParaRPr lang="ru-RU"/>
           </a:p>
@@ -8826,7 +8826,7 @@
           <a:p>
             <a:fld id="{C48F91C8-0B66-4DC6-82FA-37648DC343B9}" type="datetime1">
               <a:rPr lang="ru-RU" smtClean="0"/>
-              <a:t>03.03.2019</a:t>
+              <a:t>04.03.2019</a:t>
             </a:fld>
             <a:endParaRPr lang="ru-RU" dirty="0"/>
           </a:p>
@@ -8952,7 +8952,7 @@
         </p:blipFill>
         <p:spPr>
           <a:xfrm>
-            <a:off x="149746" y="136525"/>
+            <a:off x="333375" y="241299"/>
             <a:ext cx="1009650" cy="247650"/>
           </a:xfrm>
           <a:prstGeom prst="rect">
@@ -8988,7 +8988,7 @@
         </p:blipFill>
         <p:spPr>
           <a:xfrm>
-            <a:off x="10675360" y="86518"/>
+            <a:off x="10515599" y="241299"/>
             <a:ext cx="1343026" cy="557213"/>
           </a:xfrm>
           <a:prstGeom prst="rect">

</xml_diff>